<commit_message>
finalized deep learning slide
</commit_message>
<xml_diff>
--- a/Code/SentimentAnalysis/Deep Learning in R.pptx
+++ b/Code/SentimentAnalysis/Deep Learning in R.pptx
@@ -5,12 +5,11 @@
     <p:sldMasterId id="2147483648" r:id="rId1"/>
   </p:sldMasterIdLst>
   <p:notesMasterIdLst>
-    <p:notesMasterId r:id="rId5"/>
+    <p:notesMasterId r:id="rId4"/>
   </p:notesMasterIdLst>
   <p:sldIdLst>
     <p:sldId id="256" r:id="rId2"/>
     <p:sldId id="258" r:id="rId3"/>
-    <p:sldId id="257" r:id="rId4"/>
   </p:sldIdLst>
   <p:sldSz cx="12192000" cy="6858000"/>
   <p:notesSz cx="6858000" cy="9144000"/>
@@ -203,7 +202,7 @@
           <a:p>
             <a:fld id="{3A60F6C1-3931-48CE-BDDE-004139FB0478}" type="datetimeFigureOut">
               <a:rPr lang="en-US" smtClean="0"/>
-              <a:t>7/20/2017</a:t>
+              <a:t>8/14/2017</a:t>
             </a:fld>
             <a:endParaRPr lang="en-US"/>
           </a:p>
@@ -638,90 +637,6 @@
 </p:notes>
 </file>
 
-<file path=ppt/notesSlides/notesSlide3.xml><?xml version="1.0" encoding="utf-8"?>
-<p:notes xmlns:a="http://schemas.openxmlformats.org/drawingml/2006/main" xmlns:r="http://schemas.openxmlformats.org/officeDocument/2006/relationships" xmlns:p="http://schemas.openxmlformats.org/presentationml/2006/main">
-  <p:cSld>
-    <p:spTree>
-      <p:nvGrpSpPr>
-        <p:cNvPr id="1" name=""/>
-        <p:cNvGrpSpPr/>
-        <p:nvPr/>
-      </p:nvGrpSpPr>
-      <p:grpSpPr>
-        <a:xfrm>
-          <a:off x="0" y="0"/>
-          <a:ext cx="0" cy="0"/>
-          <a:chOff x="0" y="0"/>
-          <a:chExt cx="0" cy="0"/>
-        </a:xfrm>
-      </p:grpSpPr>
-      <p:sp>
-        <p:nvSpPr>
-          <p:cNvPr id="2" name="Slide Image Placeholder 1"/>
-          <p:cNvSpPr>
-            <a:spLocks noGrp="1" noRot="1" noChangeAspect="1"/>
-          </p:cNvSpPr>
-          <p:nvPr>
-            <p:ph type="sldImg"/>
-          </p:nvPr>
-        </p:nvSpPr>
-        <p:spPr/>
-      </p:sp>
-      <p:sp>
-        <p:nvSpPr>
-          <p:cNvPr id="3" name="Notes Placeholder 2"/>
-          <p:cNvSpPr>
-            <a:spLocks noGrp="1"/>
-          </p:cNvSpPr>
-          <p:nvPr>
-            <p:ph type="body" idx="1"/>
-          </p:nvPr>
-        </p:nvSpPr>
-        <p:spPr/>
-        <p:txBody>
-          <a:bodyPr/>
-          <a:lstStyle/>
-          <a:p>
-            <a:endParaRPr lang="en-US"/>
-          </a:p>
-        </p:txBody>
-      </p:sp>
-      <p:sp>
-        <p:nvSpPr>
-          <p:cNvPr id="4" name="Slide Number Placeholder 3"/>
-          <p:cNvSpPr>
-            <a:spLocks noGrp="1"/>
-          </p:cNvSpPr>
-          <p:nvPr>
-            <p:ph type="sldNum" sz="quarter" idx="10"/>
-          </p:nvPr>
-        </p:nvSpPr>
-        <p:spPr/>
-        <p:txBody>
-          <a:bodyPr/>
-          <a:lstStyle/>
-          <a:p>
-            <a:fld id="{1C89F719-7488-4C74-A0F8-2AB117CD79B5}" type="slidenum">
-              <a:rPr lang="en-US" smtClean="0"/>
-              <a:t>3</a:t>
-            </a:fld>
-            <a:endParaRPr lang="en-US"/>
-          </a:p>
-        </p:txBody>
-      </p:sp>
-    </p:spTree>
-    <p:extLst>
-      <p:ext uri="{BB962C8B-B14F-4D97-AF65-F5344CB8AC3E}">
-        <p14:creationId xmlns:p14="http://schemas.microsoft.com/office/powerpoint/2010/main" val="2795348062"/>
-      </p:ext>
-    </p:extLst>
-  </p:cSld>
-  <p:clrMapOvr>
-    <a:masterClrMapping/>
-  </p:clrMapOvr>
-</p:notes>
-</file>
-
 <file path=ppt/slideLayouts/slideLayout1.xml><?xml version="1.0" encoding="utf-8"?>
 <p:sldLayout xmlns:a="http://schemas.openxmlformats.org/drawingml/2006/main" xmlns:r="http://schemas.openxmlformats.org/officeDocument/2006/relationships" xmlns:p="http://schemas.openxmlformats.org/presentationml/2006/main" type="title" preserve="1">
   <p:cSld name="Title Slide">
@@ -869,7 +784,7 @@
           <a:p>
             <a:fld id="{F4440473-BE35-4A70-A526-35605AE74046}" type="datetimeFigureOut">
               <a:rPr lang="en-US" smtClean="0"/>
-              <a:t>7/20/2017</a:t>
+              <a:t>8/14/2017</a:t>
             </a:fld>
             <a:endParaRPr lang="en-US"/>
           </a:p>
@@ -1067,7 +982,7 @@
           <a:p>
             <a:fld id="{F4440473-BE35-4A70-A526-35605AE74046}" type="datetimeFigureOut">
               <a:rPr lang="en-US" smtClean="0"/>
-              <a:t>7/20/2017</a:t>
+              <a:t>8/14/2017</a:t>
             </a:fld>
             <a:endParaRPr lang="en-US"/>
           </a:p>
@@ -1275,7 +1190,7 @@
           <a:p>
             <a:fld id="{F4440473-BE35-4A70-A526-35605AE74046}" type="datetimeFigureOut">
               <a:rPr lang="en-US" smtClean="0"/>
-              <a:t>7/20/2017</a:t>
+              <a:t>8/14/2017</a:t>
             </a:fld>
             <a:endParaRPr lang="en-US"/>
           </a:p>
@@ -1473,7 +1388,7 @@
           <a:p>
             <a:fld id="{F4440473-BE35-4A70-A526-35605AE74046}" type="datetimeFigureOut">
               <a:rPr lang="en-US" smtClean="0"/>
-              <a:t>7/20/2017</a:t>
+              <a:t>8/14/2017</a:t>
             </a:fld>
             <a:endParaRPr lang="en-US"/>
           </a:p>
@@ -1748,7 +1663,7 @@
           <a:p>
             <a:fld id="{F4440473-BE35-4A70-A526-35605AE74046}" type="datetimeFigureOut">
               <a:rPr lang="en-US" smtClean="0"/>
-              <a:t>7/20/2017</a:t>
+              <a:t>8/14/2017</a:t>
             </a:fld>
             <a:endParaRPr lang="en-US"/>
           </a:p>
@@ -2013,7 +1928,7 @@
           <a:p>
             <a:fld id="{F4440473-BE35-4A70-A526-35605AE74046}" type="datetimeFigureOut">
               <a:rPr lang="en-US" smtClean="0"/>
-              <a:t>7/20/2017</a:t>
+              <a:t>8/14/2017</a:t>
             </a:fld>
             <a:endParaRPr lang="en-US"/>
           </a:p>
@@ -2425,7 +2340,7 @@
           <a:p>
             <a:fld id="{F4440473-BE35-4A70-A526-35605AE74046}" type="datetimeFigureOut">
               <a:rPr lang="en-US" smtClean="0"/>
-              <a:t>7/20/2017</a:t>
+              <a:t>8/14/2017</a:t>
             </a:fld>
             <a:endParaRPr lang="en-US"/>
           </a:p>
@@ -2566,7 +2481,7 @@
           <a:p>
             <a:fld id="{F4440473-BE35-4A70-A526-35605AE74046}" type="datetimeFigureOut">
               <a:rPr lang="en-US" smtClean="0"/>
-              <a:t>7/20/2017</a:t>
+              <a:t>8/14/2017</a:t>
             </a:fld>
             <a:endParaRPr lang="en-US"/>
           </a:p>
@@ -2679,7 +2594,7 @@
           <a:p>
             <a:fld id="{F4440473-BE35-4A70-A526-35605AE74046}" type="datetimeFigureOut">
               <a:rPr lang="en-US" smtClean="0"/>
-              <a:t>7/20/2017</a:t>
+              <a:t>8/14/2017</a:t>
             </a:fld>
             <a:endParaRPr lang="en-US"/>
           </a:p>
@@ -2990,7 +2905,7 @@
           <a:p>
             <a:fld id="{F4440473-BE35-4A70-A526-35605AE74046}" type="datetimeFigureOut">
               <a:rPr lang="en-US" smtClean="0"/>
-              <a:t>7/20/2017</a:t>
+              <a:t>8/14/2017</a:t>
             </a:fld>
             <a:endParaRPr lang="en-US"/>
           </a:p>
@@ -3278,7 +3193,7 @@
           <a:p>
             <a:fld id="{F4440473-BE35-4A70-A526-35605AE74046}" type="datetimeFigureOut">
               <a:rPr lang="en-US" smtClean="0"/>
-              <a:t>7/20/2017</a:t>
+              <a:t>8/14/2017</a:t>
             </a:fld>
             <a:endParaRPr lang="en-US"/>
           </a:p>
@@ -3519,7 +3434,7 @@
           <a:p>
             <a:fld id="{F4440473-BE35-4A70-A526-35605AE74046}" type="datetimeFigureOut">
               <a:rPr lang="en-US" smtClean="0"/>
-              <a:t>7/20/2017</a:t>
+              <a:t>8/14/2017</a:t>
             </a:fld>
             <a:endParaRPr lang="en-US"/>
           </a:p>
@@ -3985,7 +3900,14 @@
           <a:bodyPr/>
           <a:lstStyle/>
           <a:p>
-            <a:endParaRPr lang="en-US"/>
+            <a:r>
+              <a:rPr lang="en-US" dirty="0"/>
+              <a:t>KDD 2017 – Using R for Scalable Data </a:t>
+            </a:r>
+            <a:r>
+              <a:rPr lang="en-US"/>
+              <a:t>Science tutorial</a:t>
+            </a:r>
           </a:p>
         </p:txBody>
       </p:sp>
@@ -4035,14 +3957,14 @@
             <p:ph idx="1"/>
             <p:extLst>
               <p:ext uri="{D42A27DB-BD31-4B8C-83A1-F6EECF244321}">
-                <p14:modId xmlns:p14="http://schemas.microsoft.com/office/powerpoint/2010/main" val="891949130"/>
+                <p14:modId xmlns:p14="http://schemas.microsoft.com/office/powerpoint/2010/main" val="902389186"/>
               </p:ext>
             </p:extLst>
           </p:nvPr>
         </p:nvGraphicFramePr>
         <p:xfrm>
-          <a:off x="603738" y="332884"/>
-          <a:ext cx="10978663" cy="6469616"/>
+          <a:off x="0" y="0"/>
+          <a:ext cx="12192001" cy="6887791"/>
         </p:xfrm>
         <a:graphic>
           <a:graphicData uri="http://schemas.openxmlformats.org/drawingml/2006/table">
@@ -4051,35 +3973,35 @@
                 <a:tableStyleId>{21E4AEA4-8DFA-4A89-87EB-49C32662AFE0}</a:tableStyleId>
               </a:tblPr>
               <a:tblGrid>
-                <a:gridCol w="2058868">
+                <a:gridCol w="2286409">
                   <a:extLst>
                     <a:ext uri="{9D8B030D-6E8A-4147-A177-3AD203B41FA5}">
                       <a16:colId xmlns:a16="http://schemas.microsoft.com/office/drawing/2014/main" val="1549350983"/>
                     </a:ext>
                   </a:extLst>
                 </a:gridCol>
-                <a:gridCol w="1894408">
+                <a:gridCol w="2103774">
                   <a:extLst>
                     <a:ext uri="{9D8B030D-6E8A-4147-A177-3AD203B41FA5}">
                       <a16:colId xmlns:a16="http://schemas.microsoft.com/office/drawing/2014/main" val="1523924138"/>
                     </a:ext>
                   </a:extLst>
                 </a:gridCol>
-                <a:gridCol w="2264711">
+                <a:gridCol w="2164207">
                   <a:extLst>
                     <a:ext uri="{9D8B030D-6E8A-4147-A177-3AD203B41FA5}">
                       <a16:colId xmlns:a16="http://schemas.microsoft.com/office/drawing/2014/main" val="2579830152"/>
                     </a:ext>
                   </a:extLst>
                 </a:gridCol>
-                <a:gridCol w="2184967">
+                <a:gridCol w="2277735">
                   <a:extLst>
                     <a:ext uri="{9D8B030D-6E8A-4147-A177-3AD203B41FA5}">
                       <a16:colId xmlns:a16="http://schemas.microsoft.com/office/drawing/2014/main" val="4132716035"/>
                     </a:ext>
                   </a:extLst>
                 </a:gridCol>
-                <a:gridCol w="2575709">
+                <a:gridCol w="3359876">
                   <a:extLst>
                     <a:ext uri="{9D8B030D-6E8A-4147-A177-3AD203B41FA5}">
                       <a16:colId xmlns:a16="http://schemas.microsoft.com/office/drawing/2014/main" val="4082515776"/>
@@ -4087,14 +4009,14 @@
                   </a:extLst>
                 </a:gridCol>
               </a:tblGrid>
-              <a:tr h="808794">
+              <a:tr h="842935">
                 <a:tc>
                   <a:txBody>
                     <a:bodyPr/>
                     <a:lstStyle/>
                     <a:p>
                       <a:r>
-                        <a:rPr lang="en-US" dirty="0"/>
+                        <a:rPr lang="en-US" sz="1400" dirty="0"/>
                         <a:t>Package</a:t>
                       </a:r>
                     </a:p>
@@ -4107,7 +4029,7 @@
                     <a:lstStyle/>
                     <a:p>
                       <a:r>
-                        <a:rPr lang="en-US" dirty="0"/>
+                        <a:rPr lang="en-US" sz="1400" dirty="0"/>
                         <a:t>Network Architecture</a:t>
                       </a:r>
                     </a:p>
@@ -4120,7 +4042,7 @@
                     <a:lstStyle/>
                     <a:p>
                       <a:r>
-                        <a:rPr lang="en-US" dirty="0"/>
+                        <a:rPr lang="en-US" sz="1400" dirty="0"/>
                         <a:t>CPU / GPU support</a:t>
                       </a:r>
                     </a:p>
@@ -4133,7 +4055,7 @@
                     <a:lstStyle/>
                     <a:p>
                       <a:r>
-                        <a:rPr lang="en-US" dirty="0"/>
+                        <a:rPr lang="en-US" sz="1400" dirty="0"/>
                         <a:t>Tensor backend</a:t>
                       </a:r>
                     </a:p>
@@ -4146,8 +4068,8 @@
                     <a:lstStyle/>
                     <a:p>
                       <a:r>
-                        <a:rPr lang="en-US" dirty="0"/>
-                        <a:t>Pre-trained models</a:t>
+                        <a:rPr lang="en-US" sz="1400" dirty="0"/>
+                        <a:t>Reference</a:t>
                       </a:r>
                     </a:p>
                   </a:txBody>
@@ -4159,26 +4081,25 @@
                   </a:ext>
                 </a:extLst>
               </a:tr>
-              <a:tr h="468588">
+              <a:tr h="540033">
                 <a:tc>
                   <a:txBody>
                     <a:bodyPr/>
                     <a:lstStyle/>
                     <a:p>
                       <a:r>
-                        <a:rPr lang="en-US" dirty="0" err="1"/>
+                        <a:rPr lang="en-US" sz="1400" b="1" i="0" dirty="0" err="1"/>
                         <a:t>tensorflow</a:t>
                       </a:r>
+                      <a:endParaRPr lang="en-US" sz="1400" b="1" i="0" dirty="0"/>
+                    </a:p>
+                    <a:p>
                       <a:r>
-                        <a:rPr lang="en-US" dirty="0"/>
-                        <a:t> - </a:t>
-                      </a:r>
-                      <a:r>
-                        <a:rPr lang="en-US" dirty="0" err="1"/>
+                        <a:rPr lang="en-US" sz="1400" dirty="0" err="1"/>
                         <a:t>TensorFlow</a:t>
                       </a:r>
                       <a:r>
-                        <a:rPr lang="en-US" dirty="0"/>
+                        <a:rPr lang="en-US" sz="1400" dirty="0"/>
                         <a:t> for R</a:t>
                       </a:r>
                     </a:p>
@@ -4191,7 +4112,7 @@
                     <a:lstStyle/>
                     <a:p>
                       <a:r>
-                        <a:rPr lang="en-US" dirty="0"/>
+                        <a:rPr lang="en-US" sz="1400" dirty="0"/>
                         <a:t>FFNN, CNN, RNN</a:t>
                       </a:r>
                     </a:p>
@@ -4204,7 +4125,7 @@
                     <a:lstStyle/>
                     <a:p>
                       <a:r>
-                        <a:rPr lang="en-US" dirty="0"/>
+                        <a:rPr lang="en-US" sz="1400" dirty="0"/>
                         <a:t>multi-CPU, multi-GPU</a:t>
                       </a:r>
                     </a:p>
@@ -4217,137 +4138,10 @@
                     <a:lstStyle/>
                     <a:p>
                       <a:r>
-                        <a:rPr lang="en-US" dirty="0" err="1"/>
+                        <a:rPr lang="en-US" sz="1400" dirty="0" err="1"/>
                         <a:t>Tensorflow</a:t>
                       </a:r>
-                      <a:endParaRPr lang="en-US" dirty="0"/>
-                    </a:p>
-                  </a:txBody>
-                  <a:tcPr/>
-                </a:tc>
-                <a:tc>
-                  <a:txBody>
-                    <a:bodyPr/>
-                    <a:lstStyle/>
-                    <a:p>
-                      <a:r>
-                        <a:rPr lang="en-US" dirty="0"/>
-                        <a:t>?</a:t>
-                      </a:r>
-                    </a:p>
-                  </a:txBody>
-                  <a:tcPr/>
-                </a:tc>
-                <a:extLst>
-                  <a:ext uri="{0D108BD9-81ED-4DB2-BD59-A6C34878D82A}">
-                    <a16:rowId xmlns:a16="http://schemas.microsoft.com/office/drawing/2014/main" val="3344089049"/>
-                  </a:ext>
-                </a:extLst>
-              </a:tr>
-              <a:tr h="468588">
-                <a:tc>
-                  <a:txBody>
-                    <a:bodyPr/>
-                    <a:lstStyle/>
-                    <a:p>
-                      <a:r>
-                        <a:rPr lang="en-US" dirty="0" err="1"/>
-                        <a:t>mxnet</a:t>
-                      </a:r>
-                      <a:r>
-                        <a:rPr lang="en-US" dirty="0"/>
-                        <a:t> - </a:t>
-                      </a:r>
-                      <a:r>
-                        <a:rPr lang="en-US" dirty="0" err="1"/>
-                        <a:t>MXNet</a:t>
-                      </a:r>
-                      <a:r>
-                        <a:rPr lang="en-US" dirty="0"/>
-                        <a:t> R API</a:t>
-                      </a:r>
-                    </a:p>
-                  </a:txBody>
-                  <a:tcPr/>
-                </a:tc>
-                <a:tc>
-                  <a:txBody>
-                    <a:bodyPr/>
-                    <a:lstStyle/>
-                    <a:p>
-                      <a:r>
-                        <a:rPr lang="en-US" dirty="0"/>
-                        <a:t>FFNN, CNN, RNN</a:t>
-                      </a:r>
-                    </a:p>
-                  </a:txBody>
-                  <a:tcPr/>
-                </a:tc>
-                <a:tc>
-                  <a:txBody>
-                    <a:bodyPr/>
-                    <a:lstStyle/>
-                    <a:p>
-                      <a:r>
-                        <a:rPr lang="en-US" dirty="0"/>
-                        <a:t>multi-CPU, multi-GPU</a:t>
-                      </a:r>
-                    </a:p>
-                  </a:txBody>
-                  <a:tcPr/>
-                </a:tc>
-                <a:tc>
-                  <a:txBody>
-                    <a:bodyPr/>
-                    <a:lstStyle/>
-                    <a:p>
-                      <a:r>
-                        <a:rPr lang="en-US" dirty="0" err="1"/>
-                        <a:t>MXNet</a:t>
-                      </a:r>
-                      <a:endParaRPr lang="en-US" dirty="0"/>
-                    </a:p>
-                  </a:txBody>
-                  <a:tcPr/>
-                </a:tc>
-                <a:tc>
-                  <a:txBody>
-                    <a:bodyPr/>
-                    <a:lstStyle/>
-                    <a:p>
-                      <a:r>
-                        <a:rPr lang="en-US" dirty="0"/>
-                        <a:t>?</a:t>
-                      </a:r>
-                    </a:p>
-                  </a:txBody>
-                  <a:tcPr/>
-                </a:tc>
-                <a:extLst>
-                  <a:ext uri="{0D108BD9-81ED-4DB2-BD59-A6C34878D82A}">
-                    <a16:rowId xmlns:a16="http://schemas.microsoft.com/office/drawing/2014/main" val="4248717270"/>
-                  </a:ext>
-                </a:extLst>
-              </a:tr>
-              <a:tr h="808794">
-                <a:tc>
-                  <a:txBody>
-                    <a:bodyPr/>
-                    <a:lstStyle/>
-                    <a:p>
-                      <a:r>
-                        <a:rPr lang="en-US" dirty="0" err="1"/>
-                        <a:t>keras</a:t>
-                      </a:r>
-                      <a:r>
-                        <a:rPr lang="en-US" dirty="0"/>
-                        <a:t> - R interface for </a:t>
-                      </a:r>
-                      <a:r>
-                        <a:rPr lang="en-US" dirty="0" err="1"/>
-                        <a:t>Keras</a:t>
-                      </a:r>
-                      <a:endParaRPr lang="en-US" dirty="0"/>
+                      <a:endParaRPr lang="en-US" sz="1400" dirty="0"/>
                     </a:p>
                   </a:txBody>
                   <a:tcPr/>
@@ -4375,7 +4169,54 @@
                         <a:defRPr/>
                       </a:pPr>
                       <a:r>
-                        <a:rPr lang="en-US" dirty="0"/>
+                        <a:rPr lang="en-US" sz="1400" dirty="0">
+                          <a:hlinkClick r:id="rId3"/>
+                        </a:rPr>
+                        <a:t>https://tensorflow.rstudio.com/</a:t>
+                      </a:r>
+                      <a:endParaRPr lang="en-US" sz="1400" dirty="0"/>
+                    </a:p>
+                  </a:txBody>
+                  <a:tcPr/>
+                </a:tc>
+                <a:extLst>
+                  <a:ext uri="{0D108BD9-81ED-4DB2-BD59-A6C34878D82A}">
+                    <a16:rowId xmlns:a16="http://schemas.microsoft.com/office/drawing/2014/main" val="3344089049"/>
+                  </a:ext>
+                </a:extLst>
+              </a:tr>
+              <a:tr h="488369">
+                <a:tc>
+                  <a:txBody>
+                    <a:bodyPr/>
+                    <a:lstStyle/>
+                    <a:p>
+                      <a:r>
+                        <a:rPr lang="en-US" sz="1400" b="1" i="0" dirty="0" err="1"/>
+                        <a:t>mxnet</a:t>
+                      </a:r>
+                      <a:endParaRPr lang="en-US" sz="1400" b="1" i="0" dirty="0"/>
+                    </a:p>
+                    <a:p>
+                      <a:r>
+                        <a:rPr lang="en-US" sz="1400" dirty="0" err="1"/>
+                        <a:t>MXNet</a:t>
+                      </a:r>
+                      <a:r>
+                        <a:rPr lang="en-US" sz="1400" dirty="0"/>
+                        <a:t> R API</a:t>
+                      </a:r>
+                    </a:p>
+                  </a:txBody>
+                  <a:tcPr/>
+                </a:tc>
+                <a:tc>
+                  <a:txBody>
+                    <a:bodyPr/>
+                    <a:lstStyle/>
+                    <a:p>
+                      <a:r>
+                        <a:rPr lang="en-US" sz="1400" dirty="0"/>
                         <a:t>FFNN, CNN, RNN</a:t>
                       </a:r>
                     </a:p>
@@ -4388,7 +4229,7 @@
                     <a:lstStyle/>
                     <a:p>
                       <a:r>
-                        <a:rPr lang="en-US" dirty="0"/>
+                        <a:rPr lang="en-US" sz="1400" dirty="0"/>
                         <a:t>multi-CPU, multi-GPU</a:t>
                       </a:r>
                     </a:p>
@@ -4401,10 +4242,105 @@
                     <a:lstStyle/>
                     <a:p>
                       <a:r>
-                        <a:rPr lang="en-US" dirty="0" err="1"/>
-                        <a:t>Tensorflow</a:t>
+                        <a:rPr lang="en-US" sz="1400" dirty="0" err="1"/>
+                        <a:t>MXNet</a:t>
                       </a:r>
-                      <a:endParaRPr lang="en-US" dirty="0"/>
+                      <a:endParaRPr lang="en-US" sz="1400" dirty="0"/>
+                    </a:p>
+                  </a:txBody>
+                  <a:tcPr/>
+                </a:tc>
+                <a:tc>
+                  <a:txBody>
+                    <a:bodyPr/>
+                    <a:lstStyle/>
+                    <a:p>
+                      <a:pPr marL="0" marR="0" lvl="0" indent="0" algn="l" defTabSz="914400" rtl="0" eaLnBrk="1" fontAlgn="auto" latinLnBrk="0" hangingPunct="1">
+                        <a:lnSpc>
+                          <a:spcPct val="100000"/>
+                        </a:lnSpc>
+                        <a:spcBef>
+                          <a:spcPts val="0"/>
+                        </a:spcBef>
+                        <a:spcAft>
+                          <a:spcPts val="0"/>
+                        </a:spcAft>
+                        <a:buClrTx/>
+                        <a:buSzTx/>
+                        <a:buFontTx/>
+                        <a:buNone/>
+                        <a:tabLst/>
+                        <a:defRPr/>
+                      </a:pPr>
+                      <a:r>
+                        <a:rPr lang="en-US" sz="1400" dirty="0">
+                          <a:hlinkClick r:id="rId4"/>
+                        </a:rPr>
+                        <a:t>http://mxnet.io/api/r/index.html</a:t>
+                      </a:r>
+                      <a:endParaRPr lang="en-US" sz="1400" dirty="0"/>
+                    </a:p>
+                  </a:txBody>
+                  <a:tcPr/>
+                </a:tc>
+                <a:extLst>
+                  <a:ext uri="{0D108BD9-81ED-4DB2-BD59-A6C34878D82A}">
+                    <a16:rowId xmlns:a16="http://schemas.microsoft.com/office/drawing/2014/main" val="4248717270"/>
+                  </a:ext>
+                </a:extLst>
+              </a:tr>
+              <a:tr h="842935">
+                <a:tc>
+                  <a:txBody>
+                    <a:bodyPr/>
+                    <a:lstStyle/>
+                    <a:p>
+                      <a:r>
+                        <a:rPr lang="en-US" sz="1400" b="1" dirty="0" err="1"/>
+                        <a:t>keras</a:t>
+                      </a:r>
+                      <a:endParaRPr lang="en-US" sz="1400" b="1" dirty="0"/>
+                    </a:p>
+                    <a:p>
+                      <a:r>
+                        <a:rPr lang="en-US" sz="1400" dirty="0"/>
+                        <a:t>R interface for </a:t>
+                      </a:r>
+                      <a:r>
+                        <a:rPr lang="en-US" sz="1400" dirty="0" err="1"/>
+                        <a:t>Keras</a:t>
+                      </a:r>
+                      <a:endParaRPr lang="en-US" sz="1400" dirty="0"/>
+                    </a:p>
+                  </a:txBody>
+                  <a:tcPr/>
+                </a:tc>
+                <a:tc>
+                  <a:txBody>
+                    <a:bodyPr/>
+                    <a:lstStyle/>
+                    <a:p>
+                      <a:pPr marL="0" marR="0" lvl="0" indent="0" algn="l" defTabSz="914400" rtl="0" eaLnBrk="1" fontAlgn="auto" latinLnBrk="0" hangingPunct="1">
+                        <a:lnSpc>
+                          <a:spcPct val="100000"/>
+                        </a:lnSpc>
+                        <a:spcBef>
+                          <a:spcPts val="0"/>
+                        </a:spcBef>
+                        <a:spcAft>
+                          <a:spcPts val="0"/>
+                        </a:spcAft>
+                        <a:buClrTx/>
+                        <a:buSzTx/>
+                        <a:buFontTx/>
+                        <a:buNone/>
+                        <a:tabLst/>
+                        <a:defRPr/>
+                      </a:pPr>
+                      <a:r>
+                        <a:rPr lang="en-US" sz="1400" dirty="0"/>
+                        <a:t>FFNN, CNN, RNN</a:t>
+                      </a:r>
                     </a:p>
                   </a:txBody>
                   <a:tcPr/>
@@ -4415,9 +4351,64 @@
                     <a:lstStyle/>
                     <a:p>
                       <a:r>
-                        <a:rPr lang="en-US" dirty="0"/>
-                        <a:t>?</a:t>
+                        <a:rPr lang="en-US" sz="1400" dirty="0"/>
+                        <a:t>multi-CPU, multi-GPU</a:t>
                       </a:r>
+                    </a:p>
+                  </a:txBody>
+                  <a:tcPr/>
+                </a:tc>
+                <a:tc>
+                  <a:txBody>
+                    <a:bodyPr/>
+                    <a:lstStyle/>
+                    <a:p>
+                      <a:r>
+                        <a:rPr lang="en-US" sz="1400" dirty="0" err="1"/>
+                        <a:t>Tensorflow</a:t>
+                      </a:r>
+                      <a:r>
+                        <a:rPr lang="en-US" sz="1400" dirty="0"/>
+                        <a:t>, CNTK, </a:t>
+                      </a:r>
+                      <a:r>
+                        <a:rPr lang="en-US" sz="1400" dirty="0" err="1"/>
+                        <a:t>Theano</a:t>
+                      </a:r>
+                      <a:endParaRPr lang="en-US" sz="1400" dirty="0"/>
+                    </a:p>
+                  </a:txBody>
+                  <a:tcPr/>
+                </a:tc>
+                <a:tc>
+                  <a:txBody>
+                    <a:bodyPr/>
+                    <a:lstStyle/>
+                    <a:p>
+                      <a:pPr marL="0" marR="0" lvl="0" indent="0" algn="l" defTabSz="914400" rtl="0" eaLnBrk="1" fontAlgn="auto" latinLnBrk="0" hangingPunct="1">
+                        <a:lnSpc>
+                          <a:spcPct val="100000"/>
+                        </a:lnSpc>
+                        <a:spcBef>
+                          <a:spcPts val="0"/>
+                        </a:spcBef>
+                        <a:spcAft>
+                          <a:spcPts val="0"/>
+                        </a:spcAft>
+                        <a:buClrTx/>
+                        <a:buSzTx/>
+                        <a:buFontTx/>
+                        <a:buNone/>
+                        <a:tabLst/>
+                        <a:defRPr/>
+                      </a:pPr>
+                      <a:r>
+                        <a:rPr lang="en-US" sz="1400" dirty="0">
+                          <a:hlinkClick r:id="rId5"/>
+                        </a:rPr>
+                        <a:t>https://rstudio.github.io/keras/</a:t>
+                      </a:r>
+                      <a:endParaRPr lang="en-US" sz="1400" dirty="0"/>
                     </a:p>
                   </a:txBody>
                   <a:tcPr/>
@@ -4428,18 +4419,24 @@
                   </a:ext>
                 </a:extLst>
               </a:tr>
-              <a:tr h="808794">
+              <a:tr h="842935">
                 <a:tc>
                   <a:txBody>
                     <a:bodyPr/>
                     <a:lstStyle/>
                     <a:p>
                       <a:r>
-                        <a:rPr lang="en-US"/>
-                        <a:t>h2o - h2o.deepwater, </a:t>
+                        <a:rPr lang="en-US" sz="1400" b="1" dirty="0"/>
+                        <a:t>h2o</a:t>
                       </a:r>
                       <a:r>
-                        <a:rPr lang="en-US" dirty="0"/>
+                        <a:rPr lang="en-US" sz="1400" dirty="0"/>
+                        <a:t> - h2o.deepwater</a:t>
+                      </a:r>
+                    </a:p>
+                    <a:p>
+                      <a:r>
+                        <a:rPr lang="en-US" sz="1400" dirty="0"/>
                         <a:t>Deep Water R API</a:t>
                       </a:r>
                     </a:p>
@@ -4469,12 +4466,12 @@
                         <a:defRPr/>
                       </a:pPr>
                       <a:r>
-                        <a:rPr lang="en-US" dirty="0"/>
+                        <a:rPr lang="en-US" sz="1400" dirty="0"/>
                         <a:t>FFNN, CNN, RNN</a:t>
                       </a:r>
                     </a:p>
                     <a:p>
-                      <a:endParaRPr lang="en-US" dirty="0"/>
+                      <a:endParaRPr lang="en-US" sz="1400" dirty="0"/>
                     </a:p>
                   </a:txBody>
                   <a:tcPr/>
@@ -4485,7 +4482,7 @@
                     <a:lstStyle/>
                     <a:p>
                       <a:r>
-                        <a:rPr lang="en-US" dirty="0"/>
+                        <a:rPr lang="en-US" sz="1400" dirty="0"/>
                         <a:t>multi-CPU, multi-GPU</a:t>
                       </a:r>
                     </a:p>
@@ -4498,117 +4495,25 @@
                     <a:lstStyle/>
                     <a:p>
                       <a:r>
-                        <a:rPr lang="en-US" dirty="0" err="1"/>
+                        <a:rPr lang="en-US" sz="1400" dirty="0" err="1"/>
                         <a:t>Tensorflow</a:t>
                       </a:r>
                       <a:r>
-                        <a:rPr lang="en-US" dirty="0"/>
+                        <a:rPr lang="en-US" sz="1400" dirty="0"/>
                         <a:t>, Caffe, </a:t>
                       </a:r>
                       <a:r>
-                        <a:rPr lang="en-US" dirty="0" err="1"/>
+                        <a:rPr lang="en-US" sz="1400" dirty="0" err="1"/>
                         <a:t>MXNet</a:t>
                       </a:r>
                       <a:r>
-                        <a:rPr lang="en-US" dirty="0"/>
+                        <a:rPr lang="en-US" sz="1400" dirty="0"/>
                         <a:t> </a:t>
                       </a:r>
                     </a:p>
                   </a:txBody>
                   <a:tcPr/>
                 </a:tc>
-                <a:tc>
-                  <a:txBody>
-                    <a:bodyPr/>
-                    <a:lstStyle/>
-                    <a:p>
-                      <a:r>
-                        <a:rPr lang="en-US" dirty="0"/>
-                        <a:t>?</a:t>
-                      </a:r>
-                    </a:p>
-                  </a:txBody>
-                  <a:tcPr/>
-                </a:tc>
-                <a:extLst>
-                  <a:ext uri="{0D108BD9-81ED-4DB2-BD59-A6C34878D82A}">
-                    <a16:rowId xmlns:a16="http://schemas.microsoft.com/office/drawing/2014/main" val="1073388465"/>
-                  </a:ext>
-                </a:extLst>
-              </a:tr>
-              <a:tr h="1155421">
-                <a:tc>
-                  <a:txBody>
-                    <a:bodyPr/>
-                    <a:lstStyle/>
-                    <a:p>
-                      <a:r>
-                        <a:rPr lang="en-US" dirty="0"/>
-                        <a:t>h2o - h2o.deeplearning</a:t>
-                      </a:r>
-                    </a:p>
-                  </a:txBody>
-                  <a:tcPr/>
-                </a:tc>
-                <a:tc>
-                  <a:txBody>
-                    <a:bodyPr/>
-                    <a:lstStyle/>
-                    <a:p>
-                      <a:r>
-                        <a:rPr lang="en-US" dirty="0"/>
-                        <a:t>FFNN</a:t>
-                      </a:r>
-                    </a:p>
-                  </a:txBody>
-                  <a:tcPr/>
-                </a:tc>
-                <a:tc>
-                  <a:txBody>
-                    <a:bodyPr/>
-                    <a:lstStyle/>
-                    <a:p>
-                      <a:r>
-                        <a:rPr lang="en-US" dirty="0"/>
-                        <a:t>CPU</a:t>
-                      </a:r>
-                    </a:p>
-                  </a:txBody>
-                  <a:tcPr/>
-                </a:tc>
-                <a:tc>
-                  <a:txBody>
-                    <a:bodyPr/>
-                    <a:lstStyle/>
-                    <a:p>
-                      <a:r>
-                        <a:rPr lang="en-US" dirty="0"/>
-                        <a:t>NA</a:t>
-                      </a:r>
-                    </a:p>
-                  </a:txBody>
-                  <a:tcPr/>
-                </a:tc>
-                <a:tc>
-                  <a:txBody>
-                    <a:bodyPr/>
-                    <a:lstStyle/>
-                    <a:p>
-                      <a:r>
-                        <a:rPr lang="en-US" dirty="0"/>
-                        <a:t>?</a:t>
-                      </a:r>
-                    </a:p>
-                  </a:txBody>
-                  <a:tcPr/>
-                </a:tc>
-                <a:extLst>
-                  <a:ext uri="{0D108BD9-81ED-4DB2-BD59-A6C34878D82A}">
-                    <a16:rowId xmlns:a16="http://schemas.microsoft.com/office/drawing/2014/main" val="1295684402"/>
-                  </a:ext>
-                </a:extLst>
-              </a:tr>
-              <a:tr h="1502047">
                 <a:tc>
                   <a:txBody>
                     <a:bodyPr/>
@@ -4632,10 +4537,146 @@
                         <a:defRPr/>
                       </a:pPr>
                       <a:r>
-                        <a:rPr lang="en-US" dirty="0" err="1"/>
+                        <a:rPr lang="en-US" sz="1400" dirty="0">
+                          <a:hlinkClick r:id="rId6"/>
+                        </a:rPr>
+                        <a:t>https://www.h2o.ai/deep-water/</a:t>
+                      </a:r>
+                      <a:endParaRPr lang="en-US" sz="1400" dirty="0"/>
+                    </a:p>
+                  </a:txBody>
+                  <a:tcPr/>
+                </a:tc>
+                <a:extLst>
+                  <a:ext uri="{0D108BD9-81ED-4DB2-BD59-A6C34878D82A}">
+                    <a16:rowId xmlns:a16="http://schemas.microsoft.com/office/drawing/2014/main" val="1073388465"/>
+                  </a:ext>
+                </a:extLst>
+              </a:tr>
+              <a:tr h="1204194">
+                <a:tc>
+                  <a:txBody>
+                    <a:bodyPr/>
+                    <a:lstStyle/>
+                    <a:p>
+                      <a:r>
+                        <a:rPr lang="en-US" sz="1400" b="1" dirty="0"/>
+                        <a:t>h2o</a:t>
+                      </a:r>
+                      <a:r>
+                        <a:rPr lang="en-US" sz="1400" dirty="0"/>
+                        <a:t> - h2o.deeplearning</a:t>
+                      </a:r>
+                    </a:p>
+                  </a:txBody>
+                  <a:tcPr/>
+                </a:tc>
+                <a:tc>
+                  <a:txBody>
+                    <a:bodyPr/>
+                    <a:lstStyle/>
+                    <a:p>
+                      <a:r>
+                        <a:rPr lang="en-US" sz="1400" dirty="0"/>
+                        <a:t>FFNN</a:t>
+                      </a:r>
+                    </a:p>
+                  </a:txBody>
+                  <a:tcPr/>
+                </a:tc>
+                <a:tc>
+                  <a:txBody>
+                    <a:bodyPr/>
+                    <a:lstStyle/>
+                    <a:p>
+                      <a:r>
+                        <a:rPr lang="en-US" sz="1400" dirty="0"/>
+                        <a:t>CPU</a:t>
+                      </a:r>
+                    </a:p>
+                  </a:txBody>
+                  <a:tcPr/>
+                </a:tc>
+                <a:tc>
+                  <a:txBody>
+                    <a:bodyPr/>
+                    <a:lstStyle/>
+                    <a:p>
+                      <a:r>
+                        <a:rPr lang="en-US" sz="1400" dirty="0"/>
+                        <a:t>NA</a:t>
+                      </a:r>
+                    </a:p>
+                  </a:txBody>
+                  <a:tcPr/>
+                </a:tc>
+                <a:tc>
+                  <a:txBody>
+                    <a:bodyPr/>
+                    <a:lstStyle/>
+                    <a:p>
+                      <a:pPr marL="0" marR="0" lvl="0" indent="0" algn="l" defTabSz="914400" rtl="0" eaLnBrk="1" fontAlgn="auto" latinLnBrk="0" hangingPunct="1">
+                        <a:lnSpc>
+                          <a:spcPct val="100000"/>
+                        </a:lnSpc>
+                        <a:spcBef>
+                          <a:spcPts val="0"/>
+                        </a:spcBef>
+                        <a:spcAft>
+                          <a:spcPts val="0"/>
+                        </a:spcAft>
+                        <a:buClrTx/>
+                        <a:buSzTx/>
+                        <a:buFontTx/>
+                        <a:buNone/>
+                        <a:tabLst/>
+                        <a:defRPr/>
+                      </a:pPr>
+                      <a:r>
+                        <a:rPr lang="en-US" sz="1400" dirty="0">
+                          <a:hlinkClick r:id="rId7"/>
+                        </a:rPr>
+                        <a:t>http://docs.h2o.ai/h2o/latest-stable/h2o-docs/data-science/deep-learning.html</a:t>
+                      </a:r>
+                      <a:endParaRPr lang="en-US" sz="1400" dirty="0"/>
+                    </a:p>
+                  </a:txBody>
+                  <a:tcPr/>
+                </a:tc>
+                <a:extLst>
+                  <a:ext uri="{0D108BD9-81ED-4DB2-BD59-A6C34878D82A}">
+                    <a16:rowId xmlns:a16="http://schemas.microsoft.com/office/drawing/2014/main" val="1295684402"/>
+                  </a:ext>
+                </a:extLst>
+              </a:tr>
+              <a:tr h="2096599">
+                <a:tc>
+                  <a:txBody>
+                    <a:bodyPr/>
+                    <a:lstStyle/>
+                    <a:p>
+                      <a:pPr marL="0" marR="0" lvl="0" indent="0" algn="l" defTabSz="914400" rtl="0" eaLnBrk="1" fontAlgn="auto" latinLnBrk="0" hangingPunct="1">
+                        <a:lnSpc>
+                          <a:spcPct val="100000"/>
+                        </a:lnSpc>
+                        <a:spcBef>
+                          <a:spcPts val="0"/>
+                        </a:spcBef>
+                        <a:spcAft>
+                          <a:spcPts val="0"/>
+                        </a:spcAft>
+                        <a:buClrTx/>
+                        <a:buSzTx/>
+                        <a:buFontTx/>
+                        <a:buNone/>
+                        <a:tabLst/>
+                        <a:defRPr/>
+                      </a:pPr>
+                      <a:r>
+                        <a:rPr lang="en-US" sz="1400" b="1" dirty="0" err="1"/>
                         <a:t>MicrosoftML</a:t>
                       </a:r>
-                      <a:endParaRPr lang="en-US" dirty="0"/>
+                      <a:endParaRPr lang="en-US" sz="1400" b="1" dirty="0"/>
                     </a:p>
                     <a:p>
                       <a:pPr marL="0" marR="0" lvl="0" indent="0" algn="l" defTabSz="914400" rtl="0" eaLnBrk="1" fontAlgn="auto" latinLnBrk="0" hangingPunct="1">
@@ -4656,8 +4697,8 @@
                         <a:defRPr/>
                       </a:pPr>
                       <a:r>
-                        <a:rPr lang="en-US" dirty="0"/>
-                        <a:t> - Microsoft R Server</a:t>
+                        <a:rPr lang="en-US" sz="1400" dirty="0"/>
+                        <a:t>Microsoft R Server</a:t>
                       </a:r>
                     </a:p>
                   </a:txBody>
@@ -4669,7 +4710,7 @@
                     <a:lstStyle/>
                     <a:p>
                       <a:r>
-                        <a:rPr lang="en-US" dirty="0"/>
+                        <a:rPr lang="en-US" sz="1400" dirty="0"/>
                         <a:t>FFNN</a:t>
                       </a:r>
                     </a:p>
@@ -4682,9 +4723,14 @@
                     <a:lstStyle/>
                     <a:p>
                       <a:r>
-                        <a:rPr lang="en-US" dirty="0"/>
-                        <a:t>CPU, GPU (multi ?)</a:t>
+                        <a:rPr lang="en-US" sz="1400" dirty="0"/>
+                        <a:t>CPU</a:t>
                       </a:r>
+                      <a:r>
+                        <a:rPr lang="en-US" sz="1400"/>
+                        <a:t>, GPU</a:t>
+                      </a:r>
+                      <a:endParaRPr lang="en-US" sz="1400" dirty="0"/>
                     </a:p>
                   </a:txBody>
                   <a:tcPr/>
@@ -4695,7 +4741,7 @@
                     <a:lstStyle/>
                     <a:p>
                       <a:r>
-                        <a:rPr lang="en-US" dirty="0"/>
+                        <a:rPr lang="en-US" sz="1400" dirty="0"/>
                         <a:t>NA</a:t>
                       </a:r>
                     </a:p>
@@ -4707,10 +4753,46 @@
                     <a:bodyPr/>
                     <a:lstStyle/>
                     <a:p>
+                      <a:pPr marL="0" indent="0">
+                        <a:buNone/>
+                      </a:pPr>
                       <a:r>
-                        <a:rPr lang="en-US" dirty="0"/>
-                        <a:t>Cognitive Services API</a:t>
+                        <a:rPr lang="en-US" sz="1400" dirty="0"/>
+                        <a:t>1)</a:t>
                       </a:r>
+                      <a:r>
+                        <a:rPr lang="en-US" sz="1400" dirty="0">
+                          <a:hlinkClick r:id="rId8"/>
+                        </a:rPr>
+                        <a:t> </a:t>
+                      </a:r>
+                    </a:p>
+                    <a:p>
+                      <a:pPr marL="0" indent="0">
+                        <a:buNone/>
+                      </a:pPr>
+                      <a:r>
+                        <a:rPr lang="en-US" sz="1400" dirty="0">
+                          <a:hlinkClick r:id="rId8"/>
+                        </a:rPr>
+                        <a:t>https://docs.microsoft.com/en-us/r-server/r-reference/microsoftml/rxneuralnet</a:t>
+                      </a:r>
+                    </a:p>
+                    <a:p>
+                      <a:pPr marL="0" indent="0">
+                        <a:buNone/>
+                      </a:pPr>
+                      <a:r>
+                        <a:rPr lang="en-US" sz="1400" dirty="0"/>
+                        <a:t>2)</a:t>
+                      </a:r>
+                      <a:r>
+                        <a:rPr lang="en-US" sz="1400" dirty="0">
+                          <a:hlinkClick r:id="rId8"/>
+                        </a:rPr>
+                        <a:t> https://blogs.msdn.microsoft.com/microsoftrservertigerteam/2017/03/10/get-started-with-microsoftmls-rxneuralnet-with-gpu-acceleration/</a:t>
+                      </a:r>
+                      <a:endParaRPr lang="en-US" sz="1400" dirty="0"/>
                     </a:p>
                   </a:txBody>
                   <a:tcPr/>
@@ -4729,270 +4811,6 @@
     <p:extLst>
       <p:ext uri="{BB962C8B-B14F-4D97-AF65-F5344CB8AC3E}">
         <p14:creationId xmlns:p14="http://schemas.microsoft.com/office/powerpoint/2010/main" val="589621125"/>
-      </p:ext>
-    </p:extLst>
-  </p:cSld>
-  <p:clrMapOvr>
-    <a:masterClrMapping/>
-  </p:clrMapOvr>
-</p:sld>
-</file>
-
-<file path=ppt/slides/slide3.xml><?xml version="1.0" encoding="utf-8"?>
-<p:sld xmlns:a="http://schemas.openxmlformats.org/drawingml/2006/main" xmlns:r="http://schemas.openxmlformats.org/officeDocument/2006/relationships" xmlns:p="http://schemas.openxmlformats.org/presentationml/2006/main">
-  <p:cSld>
-    <p:spTree>
-      <p:nvGrpSpPr>
-        <p:cNvPr id="1" name=""/>
-        <p:cNvGrpSpPr/>
-        <p:nvPr/>
-      </p:nvGrpSpPr>
-      <p:grpSpPr>
-        <a:xfrm>
-          <a:off x="0" y="0"/>
-          <a:ext cx="0" cy="0"/>
-          <a:chOff x="0" y="0"/>
-          <a:chExt cx="0" cy="0"/>
-        </a:xfrm>
-      </p:grpSpPr>
-      <p:sp>
-        <p:nvSpPr>
-          <p:cNvPr id="3" name="Content Placeholder 2">
-            <a:extLst>
-              <a:ext uri="{FF2B5EF4-FFF2-40B4-BE49-F238E27FC236}">
-                <a16:creationId xmlns:a16="http://schemas.microsoft.com/office/drawing/2014/main" id="{3C62D748-D366-4C53-ACB3-C4EA068F94BD}"/>
-              </a:ext>
-            </a:extLst>
-          </p:cNvPr>
-          <p:cNvSpPr>
-            <a:spLocks noGrp="1"/>
-          </p:cNvSpPr>
-          <p:nvPr>
-            <p:ph idx="1"/>
-          </p:nvPr>
-        </p:nvSpPr>
-        <p:spPr>
-          <a:xfrm>
-            <a:off x="674077" y="437660"/>
-            <a:ext cx="10515600" cy="6197602"/>
-          </a:xfrm>
-        </p:spPr>
-        <p:txBody>
-          <a:bodyPr>
-            <a:normAutofit fontScale="55000" lnSpcReduction="20000"/>
-          </a:bodyPr>
-          <a:lstStyle/>
-          <a:p>
-            <a:pPr marL="0" indent="0">
-              <a:buNone/>
-            </a:pPr>
-            <a:r>
-              <a:rPr lang="en-US" sz="3600" b="1" dirty="0"/>
-              <a:t>References</a:t>
-            </a:r>
-            <a:endParaRPr lang="en-US" sz="3600" dirty="0"/>
-          </a:p>
-          <a:p>
-            <a:pPr marL="0" indent="0">
-              <a:buNone/>
-            </a:pPr>
-            <a:endParaRPr lang="en-US" dirty="0"/>
-          </a:p>
-          <a:p>
-            <a:pPr>
-              <a:buFont typeface="Calibri" panose="020F0502020204030204" pitchFamily="34" charset="0"/>
-              <a:buChar char="⁻"/>
-            </a:pPr>
-            <a:r>
-              <a:rPr lang="en-US" dirty="0" err="1"/>
-              <a:t>TensorFlow</a:t>
-            </a:r>
-            <a:r>
-              <a:rPr lang="en-US" dirty="0"/>
-              <a:t> for R</a:t>
-            </a:r>
-          </a:p>
-          <a:p>
-            <a:pPr marL="0" indent="0">
-              <a:buNone/>
-            </a:pPr>
-            <a:r>
-              <a:rPr lang="en-US" dirty="0">
-                <a:hlinkClick r:id="rId3"/>
-              </a:rPr>
-              <a:t>https://tensorflow.rstudio.com/</a:t>
-            </a:r>
-            <a:endParaRPr lang="en-US" dirty="0"/>
-          </a:p>
-          <a:p>
-            <a:pPr marL="0" indent="0">
-              <a:buNone/>
-            </a:pPr>
-            <a:endParaRPr lang="en-US" dirty="0"/>
-          </a:p>
-          <a:p>
-            <a:pPr>
-              <a:buFontTx/>
-              <a:buChar char="-"/>
-            </a:pPr>
-            <a:r>
-              <a:rPr lang="en-US" dirty="0" err="1"/>
-              <a:t>MXNet</a:t>
-            </a:r>
-            <a:r>
-              <a:rPr lang="en-US" dirty="0"/>
-              <a:t> R API</a:t>
-            </a:r>
-          </a:p>
-          <a:p>
-            <a:pPr marL="0" indent="0">
-              <a:buNone/>
-            </a:pPr>
-            <a:r>
-              <a:rPr lang="en-US" dirty="0">
-                <a:hlinkClick r:id="rId4"/>
-              </a:rPr>
-              <a:t>http://mxnet.io/api/r/index.html</a:t>
-            </a:r>
-            <a:endParaRPr lang="en-US" dirty="0"/>
-          </a:p>
-          <a:p>
-            <a:pPr marL="0" indent="0">
-              <a:buNone/>
-            </a:pPr>
-            <a:endParaRPr lang="en-US" dirty="0"/>
-          </a:p>
-          <a:p>
-            <a:pPr>
-              <a:buFontTx/>
-              <a:buChar char="-"/>
-            </a:pPr>
-            <a:r>
-              <a:rPr lang="en-US" dirty="0"/>
-              <a:t>R interface for </a:t>
-            </a:r>
-            <a:r>
-              <a:rPr lang="en-US" dirty="0" err="1"/>
-              <a:t>Keras</a:t>
-            </a:r>
-            <a:endParaRPr lang="en-US" dirty="0"/>
-          </a:p>
-          <a:p>
-            <a:pPr marL="0" indent="0">
-              <a:buNone/>
-            </a:pPr>
-            <a:r>
-              <a:rPr lang="en-US" dirty="0">
-                <a:hlinkClick r:id="rId5"/>
-              </a:rPr>
-              <a:t>https://rstudio.github.io/keras/</a:t>
-            </a:r>
-            <a:endParaRPr lang="en-US" dirty="0"/>
-          </a:p>
-          <a:p>
-            <a:pPr marL="0" indent="0">
-              <a:buNone/>
-            </a:pPr>
-            <a:endParaRPr lang="en-US" dirty="0"/>
-          </a:p>
-          <a:p>
-            <a:pPr marL="0" indent="0">
-              <a:buNone/>
-            </a:pPr>
-            <a:r>
-              <a:rPr lang="en-US" dirty="0"/>
-              <a:t>- h2o Deep Water – R API</a:t>
-            </a:r>
-          </a:p>
-          <a:p>
-            <a:pPr marL="0" indent="0">
-              <a:buNone/>
-            </a:pPr>
-            <a:r>
-              <a:rPr lang="en-US" dirty="0">
-                <a:hlinkClick r:id="rId6"/>
-              </a:rPr>
-              <a:t>https://www.h2o.ai/deep-water/</a:t>
-            </a:r>
-            <a:endParaRPr lang="en-US" dirty="0"/>
-          </a:p>
-          <a:p>
-            <a:pPr marL="0" indent="0">
-              <a:buNone/>
-            </a:pPr>
-            <a:endParaRPr lang="en-US" dirty="0"/>
-          </a:p>
-          <a:p>
-            <a:pPr>
-              <a:buFontTx/>
-              <a:buChar char="-"/>
-            </a:pPr>
-            <a:r>
-              <a:rPr lang="en-US" dirty="0"/>
-              <a:t>h2o package: h2o.deeplearning</a:t>
-            </a:r>
-          </a:p>
-          <a:p>
-            <a:pPr marL="0" indent="0">
-              <a:buNone/>
-            </a:pPr>
-            <a:r>
-              <a:rPr lang="en-US" dirty="0">
-                <a:hlinkClick r:id="rId7"/>
-              </a:rPr>
-              <a:t>http://docs.h2o.ai/h2o/latest-stable/h2o-docs/data-science/deep-learning.html</a:t>
-            </a:r>
-            <a:endParaRPr lang="en-US" dirty="0"/>
-          </a:p>
-          <a:p>
-            <a:pPr marL="0" indent="0">
-              <a:buNone/>
-            </a:pPr>
-            <a:endParaRPr lang="en-US" dirty="0"/>
-          </a:p>
-          <a:p>
-            <a:pPr>
-              <a:buFontTx/>
-              <a:buChar char="-"/>
-            </a:pPr>
-            <a:r>
-              <a:rPr lang="en-US" dirty="0" err="1"/>
-              <a:t>MicrosoftML</a:t>
-            </a:r>
-            <a:r>
-              <a:rPr lang="en-US" dirty="0"/>
-              <a:t> package (MRS)</a:t>
-            </a:r>
-          </a:p>
-          <a:p>
-            <a:pPr marL="0" indent="0">
-              <a:buNone/>
-            </a:pPr>
-            <a:r>
-              <a:rPr lang="en-US" dirty="0">
-                <a:hlinkClick r:id="rId8"/>
-              </a:rPr>
-              <a:t>https://docs.microsoft.com/en-us/r-server/r-reference/microsoftml/rxneuralnet</a:t>
-            </a:r>
-          </a:p>
-          <a:p>
-            <a:pPr marL="0" indent="0">
-              <a:buNone/>
-            </a:pPr>
-            <a:r>
-              <a:rPr lang="en-US" dirty="0">
-                <a:hlinkClick r:id="rId8"/>
-              </a:rPr>
-              <a:t>https://blogs.msdn.microsoft.com/microsoftrservertigerteam/2017/03/10/get-started-with-microsoftmls-rxneuralnet-with-gpu-acceleration/</a:t>
-            </a:r>
-            <a:endParaRPr lang="en-US" dirty="0"/>
-          </a:p>
-        </p:txBody>
-      </p:sp>
-    </p:spTree>
-    <p:extLst>
-      <p:ext uri="{BB962C8B-B14F-4D97-AF65-F5344CB8AC3E}">
-        <p14:creationId xmlns:p14="http://schemas.microsoft.com/office/powerpoint/2010/main" val="1296346393"/>
       </p:ext>
     </p:extLst>
   </p:cSld>

</xml_diff>

<commit_message>
deep learning slides addition
</commit_message>
<xml_diff>
--- a/Code/SentimentAnalysis/Deep Learning in R.pptx
+++ b/Code/SentimentAnalysis/Deep Learning in R.pptx
@@ -202,7 +202,7 @@
           <a:p>
             <a:fld id="{3A60F6C1-3931-48CE-BDDE-004139FB0478}" type="datetimeFigureOut">
               <a:rPr lang="en-US" smtClean="0"/>
-              <a:t>8/14/2017</a:t>
+              <a:t>8/16/2017</a:t>
             </a:fld>
             <a:endParaRPr lang="en-US"/>
           </a:p>
@@ -784,7 +784,7 @@
           <a:p>
             <a:fld id="{F4440473-BE35-4A70-A526-35605AE74046}" type="datetimeFigureOut">
               <a:rPr lang="en-US" smtClean="0"/>
-              <a:t>8/14/2017</a:t>
+              <a:t>8/16/2017</a:t>
             </a:fld>
             <a:endParaRPr lang="en-US"/>
           </a:p>
@@ -982,7 +982,7 @@
           <a:p>
             <a:fld id="{F4440473-BE35-4A70-A526-35605AE74046}" type="datetimeFigureOut">
               <a:rPr lang="en-US" smtClean="0"/>
-              <a:t>8/14/2017</a:t>
+              <a:t>8/16/2017</a:t>
             </a:fld>
             <a:endParaRPr lang="en-US"/>
           </a:p>
@@ -1190,7 +1190,7 @@
           <a:p>
             <a:fld id="{F4440473-BE35-4A70-A526-35605AE74046}" type="datetimeFigureOut">
               <a:rPr lang="en-US" smtClean="0"/>
-              <a:t>8/14/2017</a:t>
+              <a:t>8/16/2017</a:t>
             </a:fld>
             <a:endParaRPr lang="en-US"/>
           </a:p>
@@ -1388,7 +1388,7 @@
           <a:p>
             <a:fld id="{F4440473-BE35-4A70-A526-35605AE74046}" type="datetimeFigureOut">
               <a:rPr lang="en-US" smtClean="0"/>
-              <a:t>8/14/2017</a:t>
+              <a:t>8/16/2017</a:t>
             </a:fld>
             <a:endParaRPr lang="en-US"/>
           </a:p>
@@ -1663,7 +1663,7 @@
           <a:p>
             <a:fld id="{F4440473-BE35-4A70-A526-35605AE74046}" type="datetimeFigureOut">
               <a:rPr lang="en-US" smtClean="0"/>
-              <a:t>8/14/2017</a:t>
+              <a:t>8/16/2017</a:t>
             </a:fld>
             <a:endParaRPr lang="en-US"/>
           </a:p>
@@ -1928,7 +1928,7 @@
           <a:p>
             <a:fld id="{F4440473-BE35-4A70-A526-35605AE74046}" type="datetimeFigureOut">
               <a:rPr lang="en-US" smtClean="0"/>
-              <a:t>8/14/2017</a:t>
+              <a:t>8/16/2017</a:t>
             </a:fld>
             <a:endParaRPr lang="en-US"/>
           </a:p>
@@ -2340,7 +2340,7 @@
           <a:p>
             <a:fld id="{F4440473-BE35-4A70-A526-35605AE74046}" type="datetimeFigureOut">
               <a:rPr lang="en-US" smtClean="0"/>
-              <a:t>8/14/2017</a:t>
+              <a:t>8/16/2017</a:t>
             </a:fld>
             <a:endParaRPr lang="en-US"/>
           </a:p>
@@ -2481,7 +2481,7 @@
           <a:p>
             <a:fld id="{F4440473-BE35-4A70-A526-35605AE74046}" type="datetimeFigureOut">
               <a:rPr lang="en-US" smtClean="0"/>
-              <a:t>8/14/2017</a:t>
+              <a:t>8/16/2017</a:t>
             </a:fld>
             <a:endParaRPr lang="en-US"/>
           </a:p>
@@ -2594,7 +2594,7 @@
           <a:p>
             <a:fld id="{F4440473-BE35-4A70-A526-35605AE74046}" type="datetimeFigureOut">
               <a:rPr lang="en-US" smtClean="0"/>
-              <a:t>8/14/2017</a:t>
+              <a:t>8/16/2017</a:t>
             </a:fld>
             <a:endParaRPr lang="en-US"/>
           </a:p>
@@ -2905,7 +2905,7 @@
           <a:p>
             <a:fld id="{F4440473-BE35-4A70-A526-35605AE74046}" type="datetimeFigureOut">
               <a:rPr lang="en-US" smtClean="0"/>
-              <a:t>8/14/2017</a:t>
+              <a:t>8/16/2017</a:t>
             </a:fld>
             <a:endParaRPr lang="en-US"/>
           </a:p>
@@ -3193,7 +3193,7 @@
           <a:p>
             <a:fld id="{F4440473-BE35-4A70-A526-35605AE74046}" type="datetimeFigureOut">
               <a:rPr lang="en-US" smtClean="0"/>
-              <a:t>8/14/2017</a:t>
+              <a:t>8/16/2017</a:t>
             </a:fld>
             <a:endParaRPr lang="en-US"/>
           </a:p>
@@ -3434,7 +3434,7 @@
           <a:p>
             <a:fld id="{F4440473-BE35-4A70-A526-35605AE74046}" type="datetimeFigureOut">
               <a:rPr lang="en-US" smtClean="0"/>
-              <a:t>8/14/2017</a:t>
+              <a:t>8/16/2017</a:t>
             </a:fld>
             <a:endParaRPr lang="en-US"/>
           </a:p>
@@ -3957,7 +3957,7 @@
             <p:ph idx="1"/>
             <p:extLst>
               <p:ext uri="{D42A27DB-BD31-4B8C-83A1-F6EECF244321}">
-                <p14:modId xmlns:p14="http://schemas.microsoft.com/office/powerpoint/2010/main" val="902389186"/>
+                <p14:modId xmlns:p14="http://schemas.microsoft.com/office/powerpoint/2010/main" val="1902641003"/>
               </p:ext>
             </p:extLst>
           </p:nvPr>
@@ -4710,9 +4710,10 @@
                     <a:lstStyle/>
                     <a:p>
                       <a:r>
-                        <a:rPr lang="en-US" sz="1400" dirty="0"/>
-                        <a:t>FFNN</a:t>
+                        <a:rPr lang="en-US" sz="1400"/>
+                        <a:t>FFNN, CNN</a:t>
                       </a:r>
+                      <a:endParaRPr lang="en-US" sz="1400" dirty="0"/>
                     </a:p>
                   </a:txBody>
                   <a:tcPr/>

</xml_diff>